<commit_message>
Added LTF conclusion to status report
</commit_message>
<xml_diff>
--- a/02-status-reports/20190613/20190613_status_report.pptx
+++ b/02-status-reports/20190613/20190613_status_report.pptx
@@ -5,18 +5,19 @@
     <p:sldMasterId id="2147483648" r:id="rId1"/>
   </p:sldMasterIdLst>
   <p:notesMasterIdLst>
-    <p:notesMasterId r:id="rId8"/>
+    <p:notesMasterId r:id="rId9"/>
   </p:notesMasterIdLst>
   <p:handoutMasterIdLst>
-    <p:handoutMasterId r:id="rId9"/>
+    <p:handoutMasterId r:id="rId10"/>
   </p:handoutMasterIdLst>
   <p:sldIdLst>
     <p:sldId id="258" r:id="rId2"/>
     <p:sldId id="286" r:id="rId3"/>
     <p:sldId id="287" r:id="rId4"/>
     <p:sldId id="289" r:id="rId5"/>
-    <p:sldId id="277" r:id="rId6"/>
-    <p:sldId id="273" r:id="rId7"/>
+    <p:sldId id="290" r:id="rId6"/>
+    <p:sldId id="277" r:id="rId7"/>
+    <p:sldId id="273" r:id="rId8"/>
   </p:sldIdLst>
   <p:sldSz cx="9144000" cy="6858000" type="screen4x3"/>
   <p:notesSz cx="6858000" cy="9144000"/>
@@ -124,6 +125,7 @@
             <p14:sldId id="286"/>
             <p14:sldId id="287"/>
             <p14:sldId id="289"/>
+            <p14:sldId id="290"/>
             <p14:sldId id="277"/>
           </p14:sldIdLst>
         </p14:section>
@@ -261,7 +263,7 @@
             <a:fld id="{350B7780-B50B-474C-85C6-0B4009B6F014}" type="datetimeFigureOut">
               <a:rPr lang="de-DE" smtClean="0"/>
               <a:pPr/>
-              <a:t>12.06.2019</a:t>
+              <a:t>13.06.2019</a:t>
             </a:fld>
             <a:endParaRPr lang="de-DE"/>
           </a:p>
@@ -328,7 +330,7 @@
             <a:fld id="{D43DEED9-C1BB-4DBE-A071-13CC6F6B90F4}" type="slidenum">
               <a:rPr lang="de-DE" smtClean="0"/>
               <a:pPr/>
-              <a:t>‹#›</a:t>
+              <a:t>‹Nr.›</a:t>
             </a:fld>
             <a:endParaRPr lang="de-DE"/>
           </a:p>
@@ -584,7 +586,7 @@
             <a:fld id="{C7C1E745-E753-4EB9-8485-6560CD204B37}" type="slidenum">
               <a:rPr lang="de-DE" smtClean="0"/>
               <a:pPr/>
-              <a:t>‹#›</a:t>
+              <a:t>‹Nr.›</a:t>
             </a:fld>
             <a:endParaRPr lang="de-DE"/>
           </a:p>
@@ -843,7 +845,7 @@
             <a:fld id="{C7C1E745-E753-4EB9-8485-6560CD204B37}" type="slidenum">
               <a:rPr lang="de-DE" smtClean="0"/>
               <a:pPr/>
-              <a:t>5</a:t>
+              <a:t>6</a:t>
             </a:fld>
             <a:endParaRPr lang="de-DE"/>
           </a:p>
@@ -1519,7 +1521,7 @@
           <a:p>
             <a:fld id="{9BBAE405-9238-4745-AB75-58013C9D9462}" type="slidenum">
               <a:rPr lang="de-DE" smtClean="0"/>
-              <a:t>‹#›</a:t>
+              <a:t>‹Nr.›</a:t>
             </a:fld>
             <a:endParaRPr lang="de-DE" dirty="0"/>
           </a:p>
@@ -2340,7 +2342,7 @@
           <a:p>
             <a:fld id="{9BBAE405-9238-4745-AB75-58013C9D9462}" type="slidenum">
               <a:rPr lang="de-DE" smtClean="0"/>
-              <a:t>‹#›</a:t>
+              <a:t>‹Nr.›</a:t>
             </a:fld>
             <a:endParaRPr lang="de-DE" dirty="0"/>
           </a:p>
@@ -3109,7 +3111,7 @@
           <p:cNvPr id="2" name="Titel 1">
             <a:extLst>
               <a:ext uri="{FF2B5EF4-FFF2-40B4-BE49-F238E27FC236}">
-                <a16:creationId xmlns:a16="http://schemas.microsoft.com/office/drawing/2014/main" id="{2A42FEB0-5048-4439-BF38-0C19C3532315}"/>
+                <a16:creationId xmlns:a16="http://schemas.microsoft.com/office/drawing/2014/main" id="{3DFA8642-B0EE-4E29-8ABB-830A587E7C4E}"/>
               </a:ext>
             </a:extLst>
           </p:cNvPr>
@@ -3126,10 +3128,284 @@
           <a:lstStyle/>
           <a:p>
             <a:r>
-              <a:rPr lang="de-DE"/>
-              <a:t>Next Steps</a:t>
+              <a:rPr lang="de-DE" dirty="0"/>
+              <a:t>LTF </a:t>
+            </a:r>
+            <a:r>
+              <a:rPr lang="de-DE" dirty="0" err="1"/>
+              <a:t>Conclusions</a:t>
             </a:r>
             <a:endParaRPr lang="de-DE" dirty="0"/>
+          </a:p>
+        </p:txBody>
+      </p:sp>
+      <p:sp>
+        <p:nvSpPr>
+          <p:cNvPr id="3" name="Inhaltsplatzhalter 2">
+            <a:extLst>
+              <a:ext uri="{FF2B5EF4-FFF2-40B4-BE49-F238E27FC236}">
+                <a16:creationId xmlns:a16="http://schemas.microsoft.com/office/drawing/2014/main" id="{843F959A-6D8F-4F33-ABF1-5BC1F3277F3B}"/>
+              </a:ext>
+            </a:extLst>
+          </p:cNvPr>
+          <p:cNvSpPr>
+            <a:spLocks noGrp="1"/>
+          </p:cNvSpPr>
+          <p:nvPr>
+            <p:ph sz="half" idx="1"/>
+          </p:nvPr>
+        </p:nvSpPr>
+        <p:spPr/>
+        <p:txBody>
+          <a:bodyPr>
+            <a:normAutofit fontScale="92500" lnSpcReduction="20000"/>
+          </a:bodyPr>
+          <a:lstStyle/>
+          <a:p>
+            <a:pPr>
+              <a:buFont typeface="Arial" panose="020B0604020202020204" pitchFamily="34" charset="0"/>
+              <a:buChar char="•"/>
+            </a:pPr>
+            <a:endParaRPr lang="de-DE" dirty="0"/>
+          </a:p>
+          <a:p>
+            <a:pPr>
+              <a:buFont typeface="Arial" panose="020B0604020202020204" pitchFamily="34" charset="0"/>
+              <a:buChar char="•"/>
+            </a:pPr>
+            <a:r>
+              <a:rPr lang="de-DE" sz="1800" dirty="0"/>
+              <a:t>Zero </a:t>
+            </a:r>
+            <a:r>
+              <a:rPr lang="de-DE" sz="1800" dirty="0" err="1"/>
+              <a:t>latency</a:t>
+            </a:r>
+            <a:r>
+              <a:rPr lang="de-DE" sz="1800" dirty="0"/>
+              <a:t> </a:t>
+            </a:r>
+            <a:r>
+              <a:rPr lang="de-DE" sz="1800" dirty="0" err="1"/>
+              <a:t>reached</a:t>
+            </a:r>
+            <a:r>
+              <a:rPr lang="de-DE" sz="1800" dirty="0"/>
+              <a:t> </a:t>
+            </a:r>
+            <a:r>
+              <a:rPr lang="de-DE" sz="1800" dirty="0" err="1"/>
+              <a:t>by</a:t>
+            </a:r>
+            <a:r>
+              <a:rPr lang="de-DE" sz="1800" dirty="0"/>
+              <a:t> </a:t>
+            </a:r>
+            <a:r>
+              <a:rPr lang="de-DE" sz="1800" dirty="0" err="1"/>
+              <a:t>prediciting</a:t>
+            </a:r>
+            <a:r>
+              <a:rPr lang="de-DE" sz="1800" dirty="0"/>
+              <a:t> </a:t>
+            </a:r>
+            <a:r>
+              <a:rPr lang="de-DE" sz="1800" dirty="0" err="1"/>
+              <a:t>mean</a:t>
+            </a:r>
+            <a:r>
+              <a:rPr lang="de-DE" sz="1800" dirty="0"/>
+              <a:t> of LTF </a:t>
+            </a:r>
+            <a:r>
+              <a:rPr lang="de-DE" sz="1800" dirty="0" err="1"/>
+              <a:t>data</a:t>
+            </a:r>
+            <a:r>
+              <a:rPr lang="de-DE" sz="1800" dirty="0"/>
+              <a:t> (~55ms) </a:t>
+            </a:r>
+          </a:p>
+          <a:p>
+            <a:pPr>
+              <a:buFont typeface="Arial" panose="020B0604020202020204" pitchFamily="34" charset="0"/>
+              <a:buChar char="•"/>
+            </a:pPr>
+            <a:endParaRPr lang="de-DE" dirty="0"/>
+          </a:p>
+          <a:p>
+            <a:pPr>
+              <a:buFont typeface="Arial" panose="020B0604020202020204" pitchFamily="34" charset="0"/>
+              <a:buChar char="•"/>
+            </a:pPr>
+            <a:r>
+              <a:rPr lang="de-DE" sz="1800" dirty="0"/>
+              <a:t>NN will support </a:t>
+            </a:r>
+            <a:r>
+              <a:rPr lang="de-DE" sz="1800" dirty="0" err="1"/>
+              <a:t>prediction</a:t>
+            </a:r>
+            <a:r>
+              <a:rPr lang="de-DE" sz="1800" dirty="0"/>
+              <a:t> </a:t>
+            </a:r>
+            <a:r>
+              <a:rPr lang="de-DE" sz="1800" dirty="0" err="1"/>
+              <a:t>spectrum</a:t>
+            </a:r>
+            <a:r>
+              <a:rPr lang="de-DE" sz="1800" dirty="0"/>
+              <a:t> </a:t>
+            </a:r>
+            <a:r>
+              <a:rPr lang="de-DE" sz="1800" dirty="0" err="1"/>
+              <a:t>around</a:t>
+            </a:r>
+            <a:r>
+              <a:rPr lang="de-DE" sz="1800" dirty="0"/>
+              <a:t> </a:t>
+            </a:r>
+            <a:r>
+              <a:rPr lang="de-DE" sz="1800" dirty="0" err="1"/>
+              <a:t>mean</a:t>
+            </a:r>
+            <a:r>
+              <a:rPr lang="de-DE" sz="1800" dirty="0"/>
+              <a:t>, </a:t>
+            </a:r>
+            <a:r>
+              <a:rPr lang="de-DE" sz="1800" dirty="0" err="1"/>
+              <a:t>f.e</a:t>
+            </a:r>
+            <a:r>
+              <a:rPr lang="de-DE" dirty="0"/>
+              <a:t>.</a:t>
+            </a:r>
+          </a:p>
+          <a:p>
+            <a:pPr>
+              <a:buFont typeface="Arial" panose="020B0604020202020204" pitchFamily="34" charset="0"/>
+              <a:buChar char="•"/>
+            </a:pPr>
+            <a:endParaRPr lang="de-DE" dirty="0"/>
+          </a:p>
+          <a:p>
+            <a:pPr>
+              <a:buFont typeface="Arial" panose="020B0604020202020204" pitchFamily="34" charset="0"/>
+              <a:buChar char="•"/>
+            </a:pPr>
+            <a:endParaRPr lang="de-DE" dirty="0"/>
+          </a:p>
+          <a:p>
+            <a:pPr>
+              <a:buFont typeface="Arial" panose="020B0604020202020204" pitchFamily="34" charset="0"/>
+              <a:buChar char="•"/>
+            </a:pPr>
+            <a:endParaRPr lang="de-DE" dirty="0"/>
+          </a:p>
+          <a:p>
+            <a:pPr>
+              <a:buFont typeface="Arial" panose="020B0604020202020204" pitchFamily="34" charset="0"/>
+              <a:buChar char="•"/>
+            </a:pPr>
+            <a:endParaRPr lang="de-DE" dirty="0"/>
+          </a:p>
+          <a:p>
+            <a:pPr>
+              <a:buFont typeface="Arial" panose="020B0604020202020204" pitchFamily="34" charset="0"/>
+              <a:buChar char="•"/>
+            </a:pPr>
+            <a:endParaRPr lang="de-DE" dirty="0"/>
+          </a:p>
+          <a:p>
+            <a:pPr>
+              <a:buFont typeface="Arial" panose="020B0604020202020204" pitchFamily="34" charset="0"/>
+              <a:buChar char="•"/>
+            </a:pPr>
+            <a:endParaRPr lang="de-DE" dirty="0"/>
+          </a:p>
+          <a:p>
+            <a:pPr>
+              <a:buFont typeface="Arial" panose="020B0604020202020204" pitchFamily="34" charset="0"/>
+              <a:buChar char="•"/>
+            </a:pPr>
+            <a:endParaRPr lang="de-DE" dirty="0"/>
+          </a:p>
+          <a:p>
+            <a:pPr>
+              <a:buFont typeface="Arial" panose="020B0604020202020204" pitchFamily="34" charset="0"/>
+              <a:buChar char="•"/>
+            </a:pPr>
+            <a:endParaRPr lang="de-DE" dirty="0"/>
+          </a:p>
+          <a:p>
+            <a:pPr marL="342900">
+              <a:buFont typeface="Arial" panose="020B0604020202020204" pitchFamily="34" charset="0"/>
+              <a:buChar char="•"/>
+            </a:pPr>
+            <a:endParaRPr lang="de-DE" dirty="0"/>
+          </a:p>
+          <a:p>
+            <a:pPr marL="342900">
+              <a:buFont typeface="Arial" panose="020B0604020202020204" pitchFamily="34" charset="0"/>
+              <a:buChar char="•"/>
+            </a:pPr>
+            <a:r>
+              <a:rPr lang="de-DE" sz="1700" dirty="0" err="1"/>
+              <a:t>How</a:t>
+            </a:r>
+            <a:r>
+              <a:rPr lang="de-DE" sz="1700" dirty="0"/>
+              <a:t> to handle „</a:t>
+            </a:r>
+            <a:r>
+              <a:rPr lang="de-DE" sz="1700" dirty="0" err="1"/>
+              <a:t>over</a:t>
+            </a:r>
+            <a:r>
+              <a:rPr lang="de-DE" sz="1700" dirty="0"/>
+              <a:t>“ </a:t>
+            </a:r>
+            <a:r>
+              <a:rPr lang="de-DE" sz="1700" dirty="0" err="1"/>
+              <a:t>prediciting</a:t>
+            </a:r>
+            <a:r>
+              <a:rPr lang="de-DE" sz="1700" dirty="0"/>
+              <a:t>, </a:t>
+            </a:r>
+            <a:r>
+              <a:rPr lang="de-DE" sz="1700" dirty="0" err="1"/>
+              <a:t>f.e</a:t>
+            </a:r>
+            <a:r>
+              <a:rPr lang="de-DE" sz="1700" dirty="0"/>
+              <a:t>. </a:t>
+            </a:r>
+            <a:r>
+              <a:rPr lang="de-DE" sz="1700" dirty="0" err="1"/>
+              <a:t>if</a:t>
+            </a:r>
+            <a:r>
+              <a:rPr lang="de-DE" sz="1700" dirty="0"/>
+              <a:t> predicition@55ms &amp; RT-Latency@42ms(min LTF </a:t>
+            </a:r>
+            <a:r>
+              <a:rPr lang="de-DE" sz="1700" dirty="0" err="1"/>
+              <a:t>data</a:t>
+            </a:r>
+            <a:r>
+              <a:rPr lang="de-DE" sz="1700" dirty="0"/>
+              <a:t>)?</a:t>
+            </a:r>
+          </a:p>
+          <a:p>
+            <a:pPr indent="0"/>
+            <a:r>
+              <a:rPr lang="de-DE" dirty="0"/>
+              <a:t> </a:t>
+            </a:r>
           </a:p>
         </p:txBody>
       </p:sp>
@@ -3138,7 +3414,7 @@
           <p:cNvPr id="4" name="Foliennummernplatzhalter 3">
             <a:extLst>
               <a:ext uri="{FF2B5EF4-FFF2-40B4-BE49-F238E27FC236}">
-                <a16:creationId xmlns:a16="http://schemas.microsoft.com/office/drawing/2014/main" id="{4FCFF55B-CB17-417D-97C3-58B0E9907247}"/>
+                <a16:creationId xmlns:a16="http://schemas.microsoft.com/office/drawing/2014/main" id="{DC4C97BE-32FF-4442-956C-3F724EDD4E5E}"/>
               </a:ext>
             </a:extLst>
           </p:cNvPr>
@@ -3162,66 +3438,315 @@
           </a:p>
         </p:txBody>
       </p:sp>
-      <p:sp>
-        <p:nvSpPr>
-          <p:cNvPr id="3" name="Inhaltsplatzhalter 2">
+      <p:graphicFrame>
+        <p:nvGraphicFramePr>
+          <p:cNvPr id="5" name="Tabelle 4">
             <a:extLst>
               <a:ext uri="{FF2B5EF4-FFF2-40B4-BE49-F238E27FC236}">
-                <a16:creationId xmlns:a16="http://schemas.microsoft.com/office/drawing/2014/main" id="{7181ACB9-754C-4256-8915-87AB78FCEF1F}"/>
+                <a16:creationId xmlns:a16="http://schemas.microsoft.com/office/drawing/2014/main" id="{EA0A4B28-A876-4951-9452-1DC61F0D7DFB}"/>
               </a:ext>
             </a:extLst>
           </p:cNvPr>
-          <p:cNvSpPr>
-            <a:spLocks noGrp="1"/>
-          </p:cNvSpPr>
+          <p:cNvGraphicFramePr>
+            <a:graphicFrameLocks noGrp="1"/>
+          </p:cNvGraphicFramePr>
           <p:nvPr>
-            <p:ph sz="half" idx="1"/>
+            <p:extLst>
+              <p:ext uri="{D42A27DB-BD31-4B8C-83A1-F6EECF244321}">
+                <p14:modId xmlns:p14="http://schemas.microsoft.com/office/powerpoint/2010/main" val="709524791"/>
+              </p:ext>
+            </p:extLst>
           </p:nvPr>
-        </p:nvSpPr>
-        <p:spPr/>
-        <p:txBody>
-          <a:bodyPr/>
-          <a:lstStyle/>
-          <a:p>
-            <a:pPr>
-              <a:buFont typeface="Arial" panose="020B0604020202020204" pitchFamily="34" charset="0"/>
-              <a:buChar char="•"/>
-            </a:pPr>
-            <a:endParaRPr lang="de-DE" dirty="0"/>
-          </a:p>
-          <a:p>
-            <a:pPr>
-              <a:buFont typeface="Arial" panose="020B0604020202020204" pitchFamily="34" charset="0"/>
-              <a:buChar char="•"/>
-            </a:pPr>
-            <a:r>
-              <a:rPr lang="de-DE" dirty="0"/>
-              <a:t>Motion data acquisition framework</a:t>
-            </a:r>
-          </a:p>
-          <a:p>
-            <a:pPr>
-              <a:buFont typeface="Arial" panose="020B0604020202020204" pitchFamily="34" charset="0"/>
-              <a:buChar char="•"/>
-            </a:pPr>
-            <a:endParaRPr lang="de-DE" dirty="0"/>
-          </a:p>
-          <a:p>
-            <a:pPr>
-              <a:buFont typeface="Arial" panose="020B0604020202020204" pitchFamily="34" charset="0"/>
-              <a:buChar char="•"/>
-            </a:pPr>
-            <a:r>
-              <a:rPr lang="en-US" dirty="0"/>
-              <a:t>Gathering test data for NN training</a:t>
-            </a:r>
-          </a:p>
-        </p:txBody>
-      </p:sp>
+        </p:nvGraphicFramePr>
+        <p:xfrm>
+          <a:off x="1716360" y="3645024"/>
+          <a:ext cx="6096000" cy="1483360"/>
+        </p:xfrm>
+        <a:graphic>
+          <a:graphicData uri="http://schemas.openxmlformats.org/drawingml/2006/table">
+            <a:tbl>
+              <a:tblPr firstRow="1" bandRow="1">
+                <a:tableStyleId>{5C22544A-7EE6-4342-B048-85BDC9FD1C3A}</a:tableStyleId>
+              </a:tblPr>
+              <a:tblGrid>
+                <a:gridCol w="2032000">
+                  <a:extLst>
+                    <a:ext uri="{9D8B030D-6E8A-4147-A177-3AD203B41FA5}">
+                      <a16:colId xmlns:a16="http://schemas.microsoft.com/office/drawing/2014/main" val="1891463428"/>
+                    </a:ext>
+                  </a:extLst>
+                </a:gridCol>
+                <a:gridCol w="2032000">
+                  <a:extLst>
+                    <a:ext uri="{9D8B030D-6E8A-4147-A177-3AD203B41FA5}">
+                      <a16:colId xmlns:a16="http://schemas.microsoft.com/office/drawing/2014/main" val="3682573374"/>
+                    </a:ext>
+                  </a:extLst>
+                </a:gridCol>
+                <a:gridCol w="2032000">
+                  <a:extLst>
+                    <a:ext uri="{9D8B030D-6E8A-4147-A177-3AD203B41FA5}">
+                      <a16:colId xmlns:a16="http://schemas.microsoft.com/office/drawing/2014/main" val="2386830375"/>
+                    </a:ext>
+                  </a:extLst>
+                </a:gridCol>
+              </a:tblGrid>
+              <a:tr h="370840">
+                <a:tc>
+                  <a:txBody>
+                    <a:bodyPr/>
+                    <a:lstStyle/>
+                    <a:p>
+                      <a:r>
+                        <a:rPr lang="de-DE" dirty="0"/>
+                        <a:t>RT-</a:t>
+                      </a:r>
+                      <a:r>
+                        <a:rPr lang="de-DE" dirty="0" err="1"/>
+                        <a:t>Latency</a:t>
+                      </a:r>
+                      <a:r>
+                        <a:rPr lang="de-DE" dirty="0"/>
+                        <a:t> est.</a:t>
+                      </a:r>
+                    </a:p>
+                  </a:txBody>
+                  <a:tcPr/>
+                </a:tc>
+                <a:tc>
+                  <a:txBody>
+                    <a:bodyPr/>
+                    <a:lstStyle/>
+                    <a:p>
+                      <a:r>
+                        <a:rPr lang="de-DE" dirty="0" err="1"/>
+                        <a:t>Prediciton</a:t>
+                      </a:r>
+                      <a:endParaRPr lang="de-DE" dirty="0"/>
+                    </a:p>
+                  </a:txBody>
+                  <a:tcPr/>
+                </a:tc>
+                <a:tc>
+                  <a:txBody>
+                    <a:bodyPr/>
+                    <a:lstStyle/>
+                    <a:p>
+                      <a:r>
+                        <a:rPr lang="de-DE" dirty="0"/>
+                        <a:t>VR-Model</a:t>
+                      </a:r>
+                    </a:p>
+                  </a:txBody>
+                  <a:tcPr/>
+                </a:tc>
+                <a:extLst>
+                  <a:ext uri="{0D108BD9-81ED-4DB2-BD59-A6C34878D82A}">
+                    <a16:rowId xmlns:a16="http://schemas.microsoft.com/office/drawing/2014/main" val="2048022413"/>
+                  </a:ext>
+                </a:extLst>
+              </a:tr>
+              <a:tr h="370840">
+                <a:tc>
+                  <a:txBody>
+                    <a:bodyPr/>
+                    <a:lstStyle/>
+                    <a:p>
+                      <a:r>
+                        <a:rPr lang="de-DE" dirty="0"/>
+                        <a:t>~55ms</a:t>
+                      </a:r>
+                    </a:p>
+                  </a:txBody>
+                  <a:tcPr/>
+                </a:tc>
+                <a:tc>
+                  <a:txBody>
+                    <a:bodyPr/>
+                    <a:lstStyle/>
+                    <a:p>
+                      <a:r>
+                        <a:rPr lang="de-DE" sz="1400" dirty="0"/>
+                        <a:t>55ms/14 Frames@240Hz</a:t>
+                      </a:r>
+                    </a:p>
+                  </a:txBody>
+                  <a:tcPr/>
+                </a:tc>
+                <a:tc>
+                  <a:txBody>
+                    <a:bodyPr/>
+                    <a:lstStyle/>
+                    <a:p>
+                      <a:r>
+                        <a:rPr lang="de-DE" dirty="0"/>
+                        <a:t>0   </a:t>
+                      </a:r>
+                      <a:r>
+                        <a:rPr lang="de-DE" dirty="0" err="1"/>
+                        <a:t>ms</a:t>
+                      </a:r>
+                      <a:r>
+                        <a:rPr lang="de-DE" dirty="0"/>
+                        <a:t> </a:t>
+                      </a:r>
+                    </a:p>
+                  </a:txBody>
+                  <a:tcPr/>
+                </a:tc>
+                <a:extLst>
+                  <a:ext uri="{0D108BD9-81ED-4DB2-BD59-A6C34878D82A}">
+                    <a16:rowId xmlns:a16="http://schemas.microsoft.com/office/drawing/2014/main" val="2633922180"/>
+                  </a:ext>
+                </a:extLst>
+              </a:tr>
+              <a:tr h="370840">
+                <a:tc>
+                  <a:txBody>
+                    <a:bodyPr/>
+                    <a:lstStyle/>
+                    <a:p>
+                      <a:r>
+                        <a:rPr lang="de-DE" dirty="0"/>
+                        <a:t>~55ms</a:t>
+                      </a:r>
+                    </a:p>
+                  </a:txBody>
+                  <a:tcPr/>
+                </a:tc>
+                <a:tc>
+                  <a:txBody>
+                    <a:bodyPr/>
+                    <a:lstStyle/>
+                    <a:p>
+                      <a:r>
+                        <a:rPr lang="de-DE" sz="1400" dirty="0"/>
+                        <a:t>39ms/10 Frames@240Hz</a:t>
+                      </a:r>
+                    </a:p>
+                  </a:txBody>
+                  <a:tcPr/>
+                </a:tc>
+                <a:tc>
+                  <a:txBody>
+                    <a:bodyPr/>
+                    <a:lstStyle/>
+                    <a:p>
+                      <a:r>
+                        <a:rPr lang="de-DE" dirty="0"/>
+                        <a:t>16 </a:t>
+                      </a:r>
+                      <a:r>
+                        <a:rPr lang="de-DE" dirty="0" err="1"/>
+                        <a:t>ms</a:t>
+                      </a:r>
+                      <a:r>
+                        <a:rPr lang="de-DE" dirty="0"/>
+                        <a:t> </a:t>
+                      </a:r>
+                    </a:p>
+                  </a:txBody>
+                  <a:tcPr/>
+                </a:tc>
+                <a:extLst>
+                  <a:ext uri="{0D108BD9-81ED-4DB2-BD59-A6C34878D82A}">
+                    <a16:rowId xmlns:a16="http://schemas.microsoft.com/office/drawing/2014/main" val="3840746850"/>
+                  </a:ext>
+                </a:extLst>
+              </a:tr>
+              <a:tr h="370840">
+                <a:tc>
+                  <a:txBody>
+                    <a:bodyPr/>
+                    <a:lstStyle/>
+                    <a:p>
+                      <a:pPr marL="0" marR="0" lvl="0" indent="0" algn="l" defTabSz="914400" rtl="0" eaLnBrk="1" fontAlgn="auto" latinLnBrk="0" hangingPunct="1">
+                        <a:lnSpc>
+                          <a:spcPct val="100000"/>
+                        </a:lnSpc>
+                        <a:spcBef>
+                          <a:spcPts val="0"/>
+                        </a:spcBef>
+                        <a:spcAft>
+                          <a:spcPts val="0"/>
+                        </a:spcAft>
+                        <a:buClrTx/>
+                        <a:buSzTx/>
+                        <a:buFontTx/>
+                        <a:buNone/>
+                        <a:tabLst/>
+                        <a:defRPr/>
+                      </a:pPr>
+                      <a:r>
+                        <a:rPr lang="de-DE" dirty="0"/>
+                        <a:t>~55ms</a:t>
+                      </a:r>
+                    </a:p>
+                  </a:txBody>
+                  <a:tcPr/>
+                </a:tc>
+                <a:tc>
+                  <a:txBody>
+                    <a:bodyPr/>
+                    <a:lstStyle/>
+                    <a:p>
+                      <a:pPr marL="0" marR="0" lvl="0" indent="0" algn="l" defTabSz="914400" rtl="0" eaLnBrk="1" fontAlgn="auto" latinLnBrk="0" hangingPunct="1">
+                        <a:lnSpc>
+                          <a:spcPct val="100000"/>
+                        </a:lnSpc>
+                        <a:spcBef>
+                          <a:spcPts val="0"/>
+                        </a:spcBef>
+                        <a:spcAft>
+                          <a:spcPts val="0"/>
+                        </a:spcAft>
+                        <a:buClrTx/>
+                        <a:buSzTx/>
+                        <a:buFontTx/>
+                        <a:buNone/>
+                        <a:tabLst/>
+                        <a:defRPr/>
+                      </a:pPr>
+                      <a:r>
+                        <a:rPr lang="de-DE" sz="1400" dirty="0"/>
+                        <a:t>25ms/6 Frames@240Hz</a:t>
+                      </a:r>
+                    </a:p>
+                  </a:txBody>
+                  <a:tcPr/>
+                </a:tc>
+                <a:tc>
+                  <a:txBody>
+                    <a:bodyPr/>
+                    <a:lstStyle/>
+                    <a:p>
+                      <a:r>
+                        <a:rPr lang="de-DE" dirty="0"/>
+                        <a:t>30 </a:t>
+                      </a:r>
+                      <a:r>
+                        <a:rPr lang="de-DE" dirty="0" err="1"/>
+                        <a:t>ms</a:t>
+                      </a:r>
+                      <a:endParaRPr lang="de-DE" dirty="0"/>
+                    </a:p>
+                  </a:txBody>
+                  <a:tcPr/>
+                </a:tc>
+                <a:extLst>
+                  <a:ext uri="{0D108BD9-81ED-4DB2-BD59-A6C34878D82A}">
+                    <a16:rowId xmlns:a16="http://schemas.microsoft.com/office/drawing/2014/main" val="213588674"/>
+                  </a:ext>
+                </a:extLst>
+              </a:tr>
+            </a:tbl>
+          </a:graphicData>
+        </a:graphic>
+      </p:graphicFrame>
     </p:spTree>
     <p:extLst>
       <p:ext uri="{BB962C8B-B14F-4D97-AF65-F5344CB8AC3E}">
-        <p14:creationId xmlns:p14="http://schemas.microsoft.com/office/powerpoint/2010/main" val="3341079957"/>
+        <p14:creationId xmlns:p14="http://schemas.microsoft.com/office/powerpoint/2010/main" val="2890971259"/>
       </p:ext>
     </p:extLst>
   </p:cSld>
@@ -3250,6 +3775,150 @@
       </p:grpSpPr>
       <p:sp>
         <p:nvSpPr>
+          <p:cNvPr id="2" name="Titel 1">
+            <a:extLst>
+              <a:ext uri="{FF2B5EF4-FFF2-40B4-BE49-F238E27FC236}">
+                <a16:creationId xmlns:a16="http://schemas.microsoft.com/office/drawing/2014/main" id="{2A42FEB0-5048-4439-BF38-0C19C3532315}"/>
+              </a:ext>
+            </a:extLst>
+          </p:cNvPr>
+          <p:cNvSpPr>
+            <a:spLocks noGrp="1"/>
+          </p:cNvSpPr>
+          <p:nvPr>
+            <p:ph type="title"/>
+          </p:nvPr>
+        </p:nvSpPr>
+        <p:spPr/>
+        <p:txBody>
+          <a:bodyPr/>
+          <a:lstStyle/>
+          <a:p>
+            <a:r>
+              <a:rPr lang="de-DE"/>
+              <a:t>Next Steps</a:t>
+            </a:r>
+            <a:endParaRPr lang="de-DE" dirty="0"/>
+          </a:p>
+        </p:txBody>
+      </p:sp>
+      <p:sp>
+        <p:nvSpPr>
+          <p:cNvPr id="4" name="Foliennummernplatzhalter 3">
+            <a:extLst>
+              <a:ext uri="{FF2B5EF4-FFF2-40B4-BE49-F238E27FC236}">
+                <a16:creationId xmlns:a16="http://schemas.microsoft.com/office/drawing/2014/main" id="{4FCFF55B-CB17-417D-97C3-58B0E9907247}"/>
+              </a:ext>
+            </a:extLst>
+          </p:cNvPr>
+          <p:cNvSpPr>
+            <a:spLocks noGrp="1"/>
+          </p:cNvSpPr>
+          <p:nvPr>
+            <p:ph type="sldNum" sz="quarter" idx="10"/>
+          </p:nvPr>
+        </p:nvSpPr>
+        <p:spPr/>
+        <p:txBody>
+          <a:bodyPr/>
+          <a:lstStyle/>
+          <a:p>
+            <a:fld id="{9BBAE405-9238-4745-AB75-58013C9D9462}" type="slidenum">
+              <a:rPr lang="de-DE" smtClean="0"/>
+              <a:t>6</a:t>
+            </a:fld>
+            <a:endParaRPr lang="de-DE" dirty="0"/>
+          </a:p>
+        </p:txBody>
+      </p:sp>
+      <p:sp>
+        <p:nvSpPr>
+          <p:cNvPr id="3" name="Inhaltsplatzhalter 2">
+            <a:extLst>
+              <a:ext uri="{FF2B5EF4-FFF2-40B4-BE49-F238E27FC236}">
+                <a16:creationId xmlns:a16="http://schemas.microsoft.com/office/drawing/2014/main" id="{7181ACB9-754C-4256-8915-87AB78FCEF1F}"/>
+              </a:ext>
+            </a:extLst>
+          </p:cNvPr>
+          <p:cNvSpPr>
+            <a:spLocks noGrp="1"/>
+          </p:cNvSpPr>
+          <p:nvPr>
+            <p:ph sz="half" idx="1"/>
+          </p:nvPr>
+        </p:nvSpPr>
+        <p:spPr/>
+        <p:txBody>
+          <a:bodyPr/>
+          <a:lstStyle/>
+          <a:p>
+            <a:pPr>
+              <a:buFont typeface="Arial" panose="020B0604020202020204" pitchFamily="34" charset="0"/>
+              <a:buChar char="•"/>
+            </a:pPr>
+            <a:endParaRPr lang="de-DE" dirty="0"/>
+          </a:p>
+          <a:p>
+            <a:pPr>
+              <a:buFont typeface="Arial" panose="020B0604020202020204" pitchFamily="34" charset="0"/>
+              <a:buChar char="•"/>
+            </a:pPr>
+            <a:r>
+              <a:rPr lang="de-DE" dirty="0"/>
+              <a:t>Motion data acquisition framework</a:t>
+            </a:r>
+          </a:p>
+          <a:p>
+            <a:pPr>
+              <a:buFont typeface="Arial" panose="020B0604020202020204" pitchFamily="34" charset="0"/>
+              <a:buChar char="•"/>
+            </a:pPr>
+            <a:endParaRPr lang="de-DE" dirty="0"/>
+          </a:p>
+          <a:p>
+            <a:pPr>
+              <a:buFont typeface="Arial" panose="020B0604020202020204" pitchFamily="34" charset="0"/>
+              <a:buChar char="•"/>
+            </a:pPr>
+            <a:r>
+              <a:rPr lang="en-US" dirty="0"/>
+              <a:t>Gathering test data for NN training</a:t>
+            </a:r>
+          </a:p>
+        </p:txBody>
+      </p:sp>
+    </p:spTree>
+    <p:extLst>
+      <p:ext uri="{BB962C8B-B14F-4D97-AF65-F5344CB8AC3E}">
+        <p14:creationId xmlns:p14="http://schemas.microsoft.com/office/powerpoint/2010/main" val="3341079957"/>
+      </p:ext>
+    </p:extLst>
+  </p:cSld>
+  <p:clrMapOvr>
+    <a:masterClrMapping/>
+  </p:clrMapOvr>
+</p:sld>
+</file>
+
+<file path=ppt/slides/slide7.xml><?xml version="1.0" encoding="utf-8"?>
+<p:sld xmlns:a="http://schemas.openxmlformats.org/drawingml/2006/main" xmlns:r="http://schemas.openxmlformats.org/officeDocument/2006/relationships" xmlns:p="http://schemas.openxmlformats.org/presentationml/2006/main">
+  <p:cSld>
+    <p:spTree>
+      <p:nvGrpSpPr>
+        <p:cNvPr id="1" name=""/>
+        <p:cNvGrpSpPr/>
+        <p:nvPr/>
+      </p:nvGrpSpPr>
+      <p:grpSpPr>
+        <a:xfrm>
+          <a:off x="0" y="0"/>
+          <a:ext cx="0" cy="0"/>
+          <a:chOff x="0" y="0"/>
+          <a:chExt cx="0" cy="0"/>
+        </a:xfrm>
+      </p:grpSpPr>
+      <p:sp>
+        <p:nvSpPr>
           <p:cNvPr id="5" name="Titel 4">
             <a:extLst>
               <a:ext uri="{FF2B5EF4-FFF2-40B4-BE49-F238E27FC236}">
@@ -3318,7 +3987,7 @@
           <a:p>
             <a:fld id="{9BBAE405-9238-4745-AB75-58013C9D9462}" type="slidenum">
               <a:rPr lang="de-DE" smtClean="0"/>
-              <a:t>6</a:t>
+              <a:t>7</a:t>
             </a:fld>
             <a:endParaRPr lang="de-DE" dirty="0"/>
           </a:p>

</xml_diff>